<commit_message>
new- sensitivity analysis file
</commit_message>
<xml_diff>
--- a/model_info/AdvWorkshop_modeldiscussion.pptx
+++ b/model_info/AdvWorkshop_modeldiscussion.pptx
@@ -109,6 +109,11 @@
       </a:defRPr>
     </a:lvl9pPr>
   </p:defaultTextStyle>
+  <p:extLst>
+    <p:ext uri="{EFAFB233-063F-42B5-8137-9DF3F51BA10A}">
+      <p15:sldGuideLst xmlns:p15="http://schemas.microsoft.com/office/powerpoint/2012/main"/>
+    </p:ext>
+  </p:extLst>
 </p:presentation>
 </file>
 
@@ -194,7 +199,7 @@
           <a:p>
             <a:fld id="{AC7A3255-DA60-448C-AE37-B2B33B93352F}" type="datetimeFigureOut">
               <a:rPr lang="en-US" smtClean="0"/>
-              <a:t>3/30/2020</a:t>
+              <a:t>4/1/2020</a:t>
             </a:fld>
             <a:endParaRPr lang="en-US"/>
           </a:p>
@@ -591,9 +596,9 @@
           <a:bodyPr/>
           <a:lstStyle/>
           <a:p>
-            <a:fld id="{E5012534-A90F-41A3-B5A0-4C76FB4612D5}" type="datetime1">
-              <a:rPr lang="en-US" smtClean="0"/>
-              <a:t>3/30/2020</a:t>
+            <a:fld id="{5EFFCC8F-8E51-4784-AD75-094D6D253A65}" type="datetime1">
+              <a:rPr lang="en-US" smtClean="0"/>
+              <a:t>4/1/2020</a:t>
             </a:fld>
             <a:endParaRPr lang="en-US"/>
           </a:p>
@@ -616,7 +621,7 @@
           <a:p>
             <a:r>
               <a:rPr lang="en-US" smtClean="0"/>
-              <a:t>Advanced Decision Modeling in R. Meenakshi Srinivasan</a:t>
+              <a:t>Advanced Decision Modeling in R. Meenakshi Srinivasan, PharmD</a:t>
             </a:r>
             <a:endParaRPr lang="en-US"/>
           </a:p>
@@ -765,9 +770,9 @@
           <a:bodyPr/>
           <a:lstStyle/>
           <a:p>
-            <a:fld id="{65054C25-9C22-479A-92FA-272F1ECCD3D6}" type="datetime1">
-              <a:rPr lang="en-US" smtClean="0"/>
-              <a:t>3/30/2020</a:t>
+            <a:fld id="{4139297D-4517-434A-A1C2-F1C95DCB4D10}" type="datetime1">
+              <a:rPr lang="en-US" smtClean="0"/>
+              <a:t>4/1/2020</a:t>
             </a:fld>
             <a:endParaRPr lang="en-US"/>
           </a:p>
@@ -790,7 +795,7 @@
           <a:p>
             <a:r>
               <a:rPr lang="en-US" smtClean="0"/>
-              <a:t>Advanced Decision Modeling in R. Meenakshi Srinivasan</a:t>
+              <a:t>Advanced Decision Modeling in R. Meenakshi Srinivasan, PharmD</a:t>
             </a:r>
             <a:endParaRPr lang="en-US"/>
           </a:p>
@@ -949,9 +954,9 @@
           <a:bodyPr/>
           <a:lstStyle/>
           <a:p>
-            <a:fld id="{A5613093-7536-49F7-A8D7-08458E7747B5}" type="datetime1">
-              <a:rPr lang="en-US" smtClean="0"/>
-              <a:t>3/30/2020</a:t>
+            <a:fld id="{8DFA7087-BB1F-49AF-9616-AC08323C60A6}" type="datetime1">
+              <a:rPr lang="en-US" smtClean="0"/>
+              <a:t>4/1/2020</a:t>
             </a:fld>
             <a:endParaRPr lang="en-US"/>
           </a:p>
@@ -974,7 +979,7 @@
           <a:p>
             <a:r>
               <a:rPr lang="en-US" smtClean="0"/>
-              <a:t>Advanced Decision Modeling in R. Meenakshi Srinivasan</a:t>
+              <a:t>Advanced Decision Modeling in R. Meenakshi Srinivasan, PharmD</a:t>
             </a:r>
             <a:endParaRPr lang="en-US"/>
           </a:p>
@@ -1123,9 +1128,9 @@
           <a:bodyPr/>
           <a:lstStyle/>
           <a:p>
-            <a:fld id="{3572199A-8A22-4B4F-89C5-649ED3D655E6}" type="datetime1">
-              <a:rPr lang="en-US" smtClean="0"/>
-              <a:t>3/30/2020</a:t>
+            <a:fld id="{FAE0F223-71DB-4E2B-9C50-374660C10D9C}" type="datetime1">
+              <a:rPr lang="en-US" smtClean="0"/>
+              <a:t>4/1/2020</a:t>
             </a:fld>
             <a:endParaRPr lang="en-US"/>
           </a:p>
@@ -1148,7 +1153,7 @@
           <a:p>
             <a:r>
               <a:rPr lang="en-US" smtClean="0"/>
-              <a:t>Advanced Decision Modeling in R. Meenakshi Srinivasan</a:t>
+              <a:t>Advanced Decision Modeling in R. Meenakshi Srinivasan, PharmD</a:t>
             </a:r>
             <a:endParaRPr lang="en-US"/>
           </a:p>
@@ -1373,9 +1378,9 @@
           <a:bodyPr/>
           <a:lstStyle/>
           <a:p>
-            <a:fld id="{355242F0-7113-4FFB-8AB3-2081F0C1C60E}" type="datetime1">
-              <a:rPr lang="en-US" smtClean="0"/>
-              <a:t>3/30/2020</a:t>
+            <a:fld id="{F5598D77-838D-4197-88BC-C297F5834F60}" type="datetime1">
+              <a:rPr lang="en-US" smtClean="0"/>
+              <a:t>4/1/2020</a:t>
             </a:fld>
             <a:endParaRPr lang="en-US"/>
           </a:p>
@@ -1398,7 +1403,7 @@
           <a:p>
             <a:r>
               <a:rPr lang="en-US" smtClean="0"/>
-              <a:t>Advanced Decision Modeling in R. Meenakshi Srinivasan</a:t>
+              <a:t>Advanced Decision Modeling in R. Meenakshi Srinivasan, PharmD</a:t>
             </a:r>
             <a:endParaRPr lang="en-US"/>
           </a:p>
@@ -1609,9 +1614,9 @@
           <a:bodyPr/>
           <a:lstStyle/>
           <a:p>
-            <a:fld id="{61636FE5-BAE6-4A51-8A94-664EA1F50575}" type="datetime1">
-              <a:rPr lang="en-US" smtClean="0"/>
-              <a:t>3/30/2020</a:t>
+            <a:fld id="{33AEB271-1C67-4A4B-917D-850082860E4E}" type="datetime1">
+              <a:rPr lang="en-US" smtClean="0"/>
+              <a:t>4/1/2020</a:t>
             </a:fld>
             <a:endParaRPr lang="en-US"/>
           </a:p>
@@ -1634,7 +1639,7 @@
           <a:p>
             <a:r>
               <a:rPr lang="en-US" smtClean="0"/>
-              <a:t>Advanced Decision Modeling in R. Meenakshi Srinivasan</a:t>
+              <a:t>Advanced Decision Modeling in R. Meenakshi Srinivasan, PharmD</a:t>
             </a:r>
             <a:endParaRPr lang="en-US"/>
           </a:p>
@@ -1980,9 +1985,9 @@
           <a:bodyPr/>
           <a:lstStyle/>
           <a:p>
-            <a:fld id="{0DFFBFAB-479F-41BD-87E8-C1E77DC59107}" type="datetime1">
-              <a:rPr lang="en-US" smtClean="0"/>
-              <a:t>3/30/2020</a:t>
+            <a:fld id="{32412F03-F21B-438E-A9D6-BB4F89046E77}" type="datetime1">
+              <a:rPr lang="en-US" smtClean="0"/>
+              <a:t>4/1/2020</a:t>
             </a:fld>
             <a:endParaRPr lang="en-US"/>
           </a:p>
@@ -2005,7 +2010,7 @@
           <a:p>
             <a:r>
               <a:rPr lang="en-US" smtClean="0"/>
-              <a:t>Advanced Decision Modeling in R. Meenakshi Srinivasan</a:t>
+              <a:t>Advanced Decision Modeling in R. Meenakshi Srinivasan, PharmD</a:t>
             </a:r>
             <a:endParaRPr lang="en-US"/>
           </a:p>
@@ -2102,9 +2107,9 @@
           <a:bodyPr/>
           <a:lstStyle/>
           <a:p>
-            <a:fld id="{9F5BCD13-45ED-4680-AED0-5979E2251BBD}" type="datetime1">
-              <a:rPr lang="en-US" smtClean="0"/>
-              <a:t>3/30/2020</a:t>
+            <a:fld id="{E29ECAAE-E851-440E-9977-186B4A3D97CC}" type="datetime1">
+              <a:rPr lang="en-US" smtClean="0"/>
+              <a:t>4/1/2020</a:t>
             </a:fld>
             <a:endParaRPr lang="en-US"/>
           </a:p>
@@ -2127,7 +2132,7 @@
           <a:p>
             <a:r>
               <a:rPr lang="en-US" smtClean="0"/>
-              <a:t>Advanced Decision Modeling in R. Meenakshi Srinivasan</a:t>
+              <a:t>Advanced Decision Modeling in R. Meenakshi Srinivasan, PharmD</a:t>
             </a:r>
             <a:endParaRPr lang="en-US"/>
           </a:p>
@@ -2201,9 +2206,9 @@
           <a:bodyPr/>
           <a:lstStyle/>
           <a:p>
-            <a:fld id="{5F0B71B7-43DB-44CE-A17A-1382401ED692}" type="datetime1">
-              <a:rPr lang="en-US" smtClean="0"/>
-              <a:t>3/30/2020</a:t>
+            <a:fld id="{507294E4-7DAD-4F4B-83ED-613DE5BF4533}" type="datetime1">
+              <a:rPr lang="en-US" smtClean="0"/>
+              <a:t>4/1/2020</a:t>
             </a:fld>
             <a:endParaRPr lang="en-US"/>
           </a:p>
@@ -2226,7 +2231,7 @@
           <a:p>
             <a:r>
               <a:rPr lang="en-US" smtClean="0"/>
-              <a:t>Advanced Decision Modeling in R. Meenakshi Srinivasan</a:t>
+              <a:t>Advanced Decision Modeling in R. Meenakshi Srinivasan, PharmD</a:t>
             </a:r>
             <a:endParaRPr lang="en-US"/>
           </a:p>
@@ -2482,9 +2487,9 @@
           <a:bodyPr/>
           <a:lstStyle/>
           <a:p>
-            <a:fld id="{77266D84-CB11-422F-A00C-29970ED8D37B}" type="datetime1">
-              <a:rPr lang="en-US" smtClean="0"/>
-              <a:t>3/30/2020</a:t>
+            <a:fld id="{458DDB75-3D64-4C12-A4CD-392826AA4BB8}" type="datetime1">
+              <a:rPr lang="en-US" smtClean="0"/>
+              <a:t>4/1/2020</a:t>
             </a:fld>
             <a:endParaRPr lang="en-US"/>
           </a:p>
@@ -2507,7 +2512,7 @@
           <a:p>
             <a:r>
               <a:rPr lang="en-US" smtClean="0"/>
-              <a:t>Advanced Decision Modeling in R. Meenakshi Srinivasan</a:t>
+              <a:t>Advanced Decision Modeling in R. Meenakshi Srinivasan, PharmD</a:t>
             </a:r>
             <a:endParaRPr lang="en-US"/>
           </a:p>
@@ -2739,9 +2744,9 @@
           <a:bodyPr/>
           <a:lstStyle/>
           <a:p>
-            <a:fld id="{5A105AF7-6D19-4CE2-B328-D83192A09C0B}" type="datetime1">
-              <a:rPr lang="en-US" smtClean="0"/>
-              <a:t>3/30/2020</a:t>
+            <a:fld id="{6D1395B7-CC78-47D9-84F9-8A326A54FFDC}" type="datetime1">
+              <a:rPr lang="en-US" smtClean="0"/>
+              <a:t>4/1/2020</a:t>
             </a:fld>
             <a:endParaRPr lang="en-US"/>
           </a:p>
@@ -2764,7 +2769,7 @@
           <a:p>
             <a:r>
               <a:rPr lang="en-US" smtClean="0"/>
-              <a:t>Advanced Decision Modeling in R. Meenakshi Srinivasan</a:t>
+              <a:t>Advanced Decision Modeling in R. Meenakshi Srinivasan, PharmD</a:t>
             </a:r>
             <a:endParaRPr lang="en-US"/>
           </a:p>
@@ -2956,9 +2961,9 @@
             </a:lvl1pPr>
           </a:lstStyle>
           <a:p>
-            <a:fld id="{F6CC83A4-F71A-4DF6-8DC8-7CFD37565D5C}" type="datetime1">
-              <a:rPr lang="en-US" smtClean="0"/>
-              <a:t>3/30/2020</a:t>
+            <a:fld id="{0F4A474E-A673-4AA1-A634-66689D52FF10}" type="datetime1">
+              <a:rPr lang="en-US" smtClean="0"/>
+              <a:t>4/1/2020</a:t>
             </a:fld>
             <a:endParaRPr lang="en-US"/>
           </a:p>
@@ -2999,7 +3004,7 @@
           <a:p>
             <a:r>
               <a:rPr lang="en-US" smtClean="0"/>
-              <a:t>Advanced Decision Modeling in R. Meenakshi Srinivasan</a:t>
+              <a:t>Advanced Decision Modeling in R. Meenakshi Srinivasan, PharmD</a:t>
             </a:r>
             <a:endParaRPr lang="en-US"/>
           </a:p>
@@ -3480,14 +3485,23 @@
             <p:ph type="ftr" sz="quarter" idx="11"/>
           </p:nvPr>
         </p:nvSpPr>
-        <p:spPr/>
-        <p:txBody>
-          <a:bodyPr/>
-          <a:lstStyle/>
-          <a:p>
-            <a:r>
-              <a:rPr lang="en-US" smtClean="0"/>
-              <a:t>Advanced Decision Modeling in R. Meenakshi Srinivasan</a:t>
+        <p:spPr>
+          <a:xfrm>
+            <a:off x="3722914" y="6356350"/>
+            <a:ext cx="4430486" cy="365125"/>
+          </a:xfrm>
+        </p:spPr>
+        <p:txBody>
+          <a:bodyPr/>
+          <a:lstStyle/>
+          <a:p>
+            <a:r>
+              <a:rPr lang="en-US" dirty="0" smtClean="0"/>
+              <a:t>Advanced Decision Modeling in R. Meenakshi Srinivasan, </a:t>
+            </a:r>
+            <a:r>
+              <a:rPr lang="en-US" dirty="0" err="1" smtClean="0"/>
+              <a:t>PharmD</a:t>
             </a:r>
             <a:endParaRPr lang="en-US" dirty="0"/>
           </a:p>
@@ -3503,6 +3517,13 @@
   <p:clrMapOvr>
     <a:masterClrMapping/>
   </p:clrMapOvr>
+  <p:timing>
+    <p:tnLst>
+      <p:par>
+        <p:cTn id="1" dur="indefinite" restart="never" nodeType="tmRoot"/>
+      </p:par>
+    </p:tnLst>
+  </p:timing>
 </p:sld>
 </file>
 
@@ -4892,16 +4913,25 @@
             <p:ph type="ftr" sz="quarter" idx="11"/>
           </p:nvPr>
         </p:nvSpPr>
-        <p:spPr/>
-        <p:txBody>
-          <a:bodyPr/>
-          <a:lstStyle/>
-          <a:p>
-            <a:r>
-              <a:rPr lang="en-US" smtClean="0"/>
-              <a:t>Advanced Decision Modeling in R. Meenakshi Srinivasan</a:t>
-            </a:r>
-            <a:endParaRPr lang="en-US"/>
+        <p:spPr>
+          <a:xfrm>
+            <a:off x="3905791" y="6356350"/>
+            <a:ext cx="4247609" cy="365125"/>
+          </a:xfrm>
+        </p:spPr>
+        <p:txBody>
+          <a:bodyPr/>
+          <a:lstStyle/>
+          <a:p>
+            <a:r>
+              <a:rPr lang="en-US" dirty="0" smtClean="0"/>
+              <a:t>Advanced Decision Modeling in R. Meenakshi Srinivasan, </a:t>
+            </a:r>
+            <a:r>
+              <a:rPr lang="en-US" dirty="0" err="1" smtClean="0"/>
+              <a:t>PharmD</a:t>
+            </a:r>
+            <a:endParaRPr lang="en-US" dirty="0"/>
           </a:p>
         </p:txBody>
       </p:sp>
@@ -5149,16 +5179,25 @@
             <p:ph type="ftr" sz="quarter" idx="11"/>
           </p:nvPr>
         </p:nvSpPr>
-        <p:spPr/>
-        <p:txBody>
-          <a:bodyPr/>
-          <a:lstStyle/>
-          <a:p>
-            <a:r>
-              <a:rPr lang="en-US" smtClean="0"/>
-              <a:t>Advanced Decision Modeling in R. Meenakshi Srinivasan</a:t>
-            </a:r>
-            <a:endParaRPr lang="en-US"/>
+        <p:spPr>
+          <a:xfrm>
+            <a:off x="3906588" y="6356350"/>
+            <a:ext cx="4857206" cy="365125"/>
+          </a:xfrm>
+        </p:spPr>
+        <p:txBody>
+          <a:bodyPr/>
+          <a:lstStyle/>
+          <a:p>
+            <a:r>
+              <a:rPr lang="en-US" dirty="0" smtClean="0"/>
+              <a:t>Advanced Decision Modeling in R. Meenakshi Srinivasan, </a:t>
+            </a:r>
+            <a:r>
+              <a:rPr lang="en-US" dirty="0" err="1" smtClean="0"/>
+              <a:t>PharmD</a:t>
+            </a:r>
+            <a:endParaRPr lang="en-US" dirty="0"/>
           </a:p>
         </p:txBody>
       </p:sp>

</xml_diff>